<commit_message>
Fixed accelerometer. Closes #346.
</commit_message>
<xml_diff>
--- a/Architecture/Source.pptx
+++ b/Architecture/Source.pptx
@@ -288,7 +288,7 @@
           <a:p>
             <a:fld id="{4EB55246-26D4-B843-A31D-0832833747D9}" type="datetimeFigureOut">
               <a:rPr lang="en-US" smtClean="0"/>
-              <a:t>6/7/15</a:t>
+              <a:t>6/14/17</a:t>
             </a:fld>
             <a:endParaRPr lang="en-US"/>
           </a:p>
@@ -458,7 +458,7 @@
           <a:p>
             <a:fld id="{4EB55246-26D4-B843-A31D-0832833747D9}" type="datetimeFigureOut">
               <a:rPr lang="en-US" smtClean="0"/>
-              <a:t>6/7/15</a:t>
+              <a:t>6/14/17</a:t>
             </a:fld>
             <a:endParaRPr lang="en-US"/>
           </a:p>
@@ -638,7 +638,7 @@
           <a:p>
             <a:fld id="{4EB55246-26D4-B843-A31D-0832833747D9}" type="datetimeFigureOut">
               <a:rPr lang="en-US" smtClean="0"/>
-              <a:t>6/7/15</a:t>
+              <a:t>6/14/17</a:t>
             </a:fld>
             <a:endParaRPr lang="en-US"/>
           </a:p>
@@ -808,7 +808,7 @@
           <a:p>
             <a:fld id="{4EB55246-26D4-B843-A31D-0832833747D9}" type="datetimeFigureOut">
               <a:rPr lang="en-US" smtClean="0"/>
-              <a:t>6/7/15</a:t>
+              <a:t>6/14/17</a:t>
             </a:fld>
             <a:endParaRPr lang="en-US"/>
           </a:p>
@@ -1054,7 +1054,7 @@
           <a:p>
             <a:fld id="{4EB55246-26D4-B843-A31D-0832833747D9}" type="datetimeFigureOut">
               <a:rPr lang="en-US" smtClean="0"/>
-              <a:t>6/7/15</a:t>
+              <a:t>6/14/17</a:t>
             </a:fld>
             <a:endParaRPr lang="en-US"/>
           </a:p>
@@ -1342,7 +1342,7 @@
           <a:p>
             <a:fld id="{4EB55246-26D4-B843-A31D-0832833747D9}" type="datetimeFigureOut">
               <a:rPr lang="en-US" smtClean="0"/>
-              <a:t>6/7/15</a:t>
+              <a:t>6/14/17</a:t>
             </a:fld>
             <a:endParaRPr lang="en-US"/>
           </a:p>
@@ -1764,7 +1764,7 @@
           <a:p>
             <a:fld id="{4EB55246-26D4-B843-A31D-0832833747D9}" type="datetimeFigureOut">
               <a:rPr lang="en-US" smtClean="0"/>
-              <a:t>6/7/15</a:t>
+              <a:t>6/14/17</a:t>
             </a:fld>
             <a:endParaRPr lang="en-US"/>
           </a:p>
@@ -1882,7 +1882,7 @@
           <a:p>
             <a:fld id="{4EB55246-26D4-B843-A31D-0832833747D9}" type="datetimeFigureOut">
               <a:rPr lang="en-US" smtClean="0"/>
-              <a:t>6/7/15</a:t>
+              <a:t>6/14/17</a:t>
             </a:fld>
             <a:endParaRPr lang="en-US"/>
           </a:p>
@@ -1977,7 +1977,7 @@
           <a:p>
             <a:fld id="{4EB55246-26D4-B843-A31D-0832833747D9}" type="datetimeFigureOut">
               <a:rPr lang="en-US" smtClean="0"/>
-              <a:t>6/7/15</a:t>
+              <a:t>6/14/17</a:t>
             </a:fld>
             <a:endParaRPr lang="en-US"/>
           </a:p>
@@ -2254,7 +2254,7 @@
           <a:p>
             <a:fld id="{4EB55246-26D4-B843-A31D-0832833747D9}" type="datetimeFigureOut">
               <a:rPr lang="en-US" smtClean="0"/>
-              <a:t>6/7/15</a:t>
+              <a:t>6/14/17</a:t>
             </a:fld>
             <a:endParaRPr lang="en-US"/>
           </a:p>
@@ -2507,7 +2507,7 @@
           <a:p>
             <a:fld id="{4EB55246-26D4-B843-A31D-0832833747D9}" type="datetimeFigureOut">
               <a:rPr lang="en-US" smtClean="0"/>
-              <a:t>6/7/15</a:t>
+              <a:t>6/14/17</a:t>
             </a:fld>
             <a:endParaRPr lang="en-US"/>
           </a:p>
@@ -2720,7 +2720,7 @@
           <a:p>
             <a:fld id="{4EB55246-26D4-B843-A31D-0832833747D9}" type="datetimeFigureOut">
               <a:rPr lang="en-US" smtClean="0"/>
-              <a:t>6/7/15</a:t>
+              <a:t>6/14/17</a:t>
             </a:fld>
             <a:endParaRPr lang="en-US"/>
           </a:p>
@@ -3097,41 +3097,29 @@
       </p:grpSpPr>
       <p:sp>
         <p:nvSpPr>
-          <p:cNvPr id="59" name="Rounded Rectangle 58"/>
+          <p:cNvPr id="56" name="Rounded Rectangle 55"/>
           <p:cNvSpPr/>
           <p:nvPr/>
         </p:nvSpPr>
         <p:spPr>
           <a:xfrm>
-            <a:off x="6271176" y="0"/>
-            <a:ext cx="2872825" cy="3306566"/>
+            <a:off x="5476747" y="0"/>
+            <a:ext cx="3152129" cy="3306566"/>
           </a:xfrm>
           <a:prstGeom prst="roundRect">
             <a:avLst/>
           </a:prstGeom>
-          <a:solidFill>
-            <a:schemeClr val="accent3">
-              <a:lumMod val="40000"/>
-              <a:lumOff val="60000"/>
-            </a:schemeClr>
-          </a:solidFill>
-          <a:ln>
-            <a:solidFill>
-              <a:schemeClr val="accent3">
-                <a:lumMod val="75000"/>
-              </a:schemeClr>
-            </a:solidFill>
-          </a:ln>
+          <a:ln/>
         </p:spPr>
         <p:style>
-          <a:lnRef idx="1">
-            <a:schemeClr val="accent1"/>
+          <a:lnRef idx="0">
+            <a:schemeClr val="accent3"/>
           </a:lnRef>
           <a:fillRef idx="3">
-            <a:schemeClr val="accent1"/>
+            <a:schemeClr val="accent3"/>
           </a:fillRef>
-          <a:effectRef idx="2">
-            <a:schemeClr val="accent1"/>
+          <a:effectRef idx="3">
+            <a:schemeClr val="accent3"/>
           </a:effectRef>
           <a:fontRef idx="minor">
             <a:schemeClr val="lt1"/>
@@ -3142,47 +3130,38 @@
           <a:lstStyle/>
           <a:p>
             <a:pPr algn="ctr"/>
-            <a:endParaRPr lang="en-US"/>
-          </a:p>
-        </p:txBody>
-      </p:sp>
-      <p:sp>
-        <p:nvSpPr>
-          <p:cNvPr id="56" name="Rounded Rectangle 55"/>
+            <a:endParaRPr lang="en-US">
+              <a:latin typeface="Times New Roman"/>
+              <a:cs typeface="Times New Roman"/>
+            </a:endParaRPr>
+          </a:p>
+        </p:txBody>
+      </p:sp>
+      <p:sp>
+        <p:nvSpPr>
+          <p:cNvPr id="42" name="Rounded Rectangle 41"/>
           <p:cNvSpPr/>
           <p:nvPr/>
         </p:nvSpPr>
         <p:spPr>
           <a:xfrm>
-            <a:off x="3119047" y="0"/>
+            <a:off x="2305662" y="0"/>
             <a:ext cx="3152129" cy="3306566"/>
           </a:xfrm>
           <a:prstGeom prst="roundRect">
             <a:avLst/>
           </a:prstGeom>
-          <a:solidFill>
-            <a:schemeClr val="accent3">
-              <a:lumMod val="40000"/>
-              <a:lumOff val="60000"/>
-            </a:schemeClr>
-          </a:solidFill>
-          <a:ln>
-            <a:solidFill>
-              <a:schemeClr val="accent3">
-                <a:lumMod val="75000"/>
-              </a:schemeClr>
-            </a:solidFill>
-          </a:ln>
+          <a:ln/>
         </p:spPr>
         <p:style>
-          <a:lnRef idx="1">
-            <a:schemeClr val="accent1"/>
+          <a:lnRef idx="0">
+            <a:schemeClr val="accent3"/>
           </a:lnRef>
           <a:fillRef idx="3">
-            <a:schemeClr val="accent1"/>
+            <a:schemeClr val="accent3"/>
           </a:fillRef>
-          <a:effectRef idx="2">
-            <a:schemeClr val="accent1"/>
+          <a:effectRef idx="3">
+            <a:schemeClr val="accent3"/>
           </a:effectRef>
           <a:fontRef idx="minor">
             <a:schemeClr val="lt1"/>
@@ -3193,159 +3172,389 @@
           <a:lstStyle/>
           <a:p>
             <a:pPr algn="ctr"/>
-            <a:endParaRPr lang="en-US"/>
-          </a:p>
-        </p:txBody>
-      </p:sp>
-      <p:sp>
-        <p:nvSpPr>
-          <p:cNvPr id="42" name="Rounded Rectangle 41"/>
+            <a:endParaRPr lang="en-US">
+              <a:latin typeface="Times New Roman"/>
+              <a:cs typeface="Times New Roman"/>
+            </a:endParaRPr>
+          </a:p>
+        </p:txBody>
+      </p:sp>
+      <p:sp>
+        <p:nvSpPr>
+          <p:cNvPr id="41" name="Rounded Rectangle 40"/>
           <p:cNvSpPr/>
           <p:nvPr/>
         </p:nvSpPr>
         <p:spPr>
           <a:xfrm>
-            <a:off x="-33082" y="0"/>
-            <a:ext cx="3152129" cy="3306566"/>
+            <a:off x="2404132" y="4691257"/>
+            <a:ext cx="6224744" cy="2124328"/>
           </a:xfrm>
           <a:prstGeom prst="roundRect">
             <a:avLst/>
           </a:prstGeom>
-          <a:solidFill>
-            <a:schemeClr val="accent3">
-              <a:lumMod val="40000"/>
-              <a:lumOff val="60000"/>
-            </a:schemeClr>
-          </a:solidFill>
-          <a:ln>
-            <a:solidFill>
-              <a:schemeClr val="accent3">
-                <a:lumMod val="75000"/>
-              </a:schemeClr>
-            </a:solidFill>
-          </a:ln>
+          <a:ln/>
         </p:spPr>
         <p:style>
-          <a:lnRef idx="1">
-            <a:schemeClr val="accent1"/>
+          <a:lnRef idx="0">
+            <a:schemeClr val="accent4"/>
           </a:lnRef>
           <a:fillRef idx="3">
-            <a:schemeClr val="accent1"/>
+            <a:schemeClr val="accent4"/>
           </a:fillRef>
-          <a:effectRef idx="2">
-            <a:schemeClr val="accent1"/>
+          <a:effectRef idx="3">
+            <a:schemeClr val="accent4"/>
           </a:effectRef>
           <a:fontRef idx="minor">
             <a:schemeClr val="lt1"/>
           </a:fontRef>
         </p:style>
         <p:txBody>
-          <a:bodyPr rtlCol="0" anchor="ctr"/>
+          <a:bodyPr rtlCol="0" anchor="t"/>
           <a:lstStyle/>
           <a:p>
             <a:pPr algn="ctr"/>
-            <a:endParaRPr lang="en-US"/>
-          </a:p>
-        </p:txBody>
-      </p:sp>
-      <p:sp>
-        <p:nvSpPr>
-          <p:cNvPr id="41" name="Rounded Rectangle 40"/>
+            <a:r>
+              <a:rPr lang="en-US" u="sng" dirty="0" smtClean="0">
+                <a:solidFill>
+                  <a:srgbClr val="000000"/>
+                </a:solidFill>
+                <a:latin typeface="Times New Roman"/>
+                <a:cs typeface="Times New Roman"/>
+              </a:rPr>
+              <a:t>Cross-Platform, </a:t>
+            </a:r>
+            <a:r>
+              <a:rPr lang="en-US" u="sng" dirty="0" smtClean="0">
+                <a:solidFill>
+                  <a:srgbClr val="000000"/>
+                </a:solidFill>
+                <a:latin typeface="Times New Roman"/>
+                <a:cs typeface="Times New Roman"/>
+              </a:rPr>
+              <a:t>Shared Codebase</a:t>
+            </a:r>
+          </a:p>
+          <a:p>
+            <a:endParaRPr lang="en-US" sz="600" dirty="0" smtClean="0">
+              <a:solidFill>
+                <a:srgbClr val="000000"/>
+              </a:solidFill>
+              <a:latin typeface="Times New Roman"/>
+              <a:cs typeface="Times New Roman"/>
+            </a:endParaRPr>
+          </a:p>
+          <a:p>
+            <a:r>
+              <a:rPr lang="en-US" sz="1400" dirty="0" smtClean="0">
+                <a:solidFill>
+                  <a:srgbClr val="000000"/>
+                </a:solidFill>
+                <a:latin typeface="Times New Roman"/>
+                <a:cs typeface="Times New Roman"/>
+              </a:rPr>
+              <a:t>Platform-independent logic that implements</a:t>
+            </a:r>
+            <a:r>
+              <a:rPr lang="is-IS" sz="1400" dirty="0" smtClean="0">
+                <a:solidFill>
+                  <a:srgbClr val="000000"/>
+                </a:solidFill>
+                <a:latin typeface="Times New Roman"/>
+                <a:cs typeface="Times New Roman"/>
+              </a:rPr>
+              <a:t>…</a:t>
+            </a:r>
+          </a:p>
+          <a:p>
+            <a:endParaRPr lang="en-US" sz="600" dirty="0" smtClean="0">
+              <a:solidFill>
+                <a:srgbClr val="000000"/>
+              </a:solidFill>
+              <a:latin typeface="Times New Roman"/>
+              <a:cs typeface="Times New Roman"/>
+            </a:endParaRPr>
+          </a:p>
+          <a:p>
+            <a:pPr marL="285750" indent="-285750">
+              <a:buFont typeface="Arial"/>
+              <a:buChar char="•"/>
+            </a:pPr>
+            <a:r>
+              <a:rPr lang="en-US" sz="1400" dirty="0" smtClean="0">
+                <a:solidFill>
+                  <a:srgbClr val="000000"/>
+                </a:solidFill>
+                <a:latin typeface="Times New Roman"/>
+                <a:cs typeface="Times New Roman"/>
+              </a:rPr>
+              <a:t>REaDI Sense study management</a:t>
+            </a:r>
+          </a:p>
+          <a:p>
+            <a:pPr marL="285750" indent="-285750">
+              <a:buFont typeface="Arial"/>
+              <a:buChar char="•"/>
+            </a:pPr>
+            <a:r>
+              <a:rPr lang="en-US" sz="1400" dirty="0">
+                <a:solidFill>
+                  <a:srgbClr val="000000"/>
+                </a:solidFill>
+                <a:latin typeface="Times New Roman"/>
+                <a:cs typeface="Times New Roman"/>
+              </a:rPr>
+              <a:t>p</a:t>
+            </a:r>
+            <a:r>
+              <a:rPr lang="en-US" sz="1400" dirty="0" smtClean="0">
+                <a:solidFill>
+                  <a:srgbClr val="000000"/>
+                </a:solidFill>
+                <a:latin typeface="Times New Roman"/>
+                <a:cs typeface="Times New Roman"/>
+              </a:rPr>
+              <a:t>articipant enrollment </a:t>
+            </a:r>
+          </a:p>
+          <a:p>
+            <a:pPr marL="285750" indent="-285750">
+              <a:buFont typeface="Arial"/>
+              <a:buChar char="•"/>
+            </a:pPr>
+            <a:r>
+              <a:rPr lang="en-US" sz="1400" dirty="0">
+                <a:solidFill>
+                  <a:srgbClr val="000000"/>
+                </a:solidFill>
+                <a:latin typeface="Times New Roman"/>
+                <a:cs typeface="Times New Roman"/>
+              </a:rPr>
+              <a:t>s</a:t>
+            </a:r>
+            <a:r>
+              <a:rPr lang="en-US" sz="1400" dirty="0" smtClean="0">
+                <a:solidFill>
+                  <a:srgbClr val="000000"/>
+                </a:solidFill>
+                <a:latin typeface="Times New Roman"/>
+                <a:cs typeface="Times New Roman"/>
+              </a:rPr>
+              <a:t>ensor configuration and tasking</a:t>
+            </a:r>
+          </a:p>
+          <a:p>
+            <a:pPr marL="285750" indent="-285750">
+              <a:buFont typeface="Arial"/>
+              <a:buChar char="•"/>
+            </a:pPr>
+            <a:r>
+              <a:rPr lang="en-US" sz="1400" dirty="0">
+                <a:solidFill>
+                  <a:srgbClr val="000000"/>
+                </a:solidFill>
+                <a:latin typeface="Times New Roman"/>
+                <a:cs typeface="Times New Roman"/>
+              </a:rPr>
+              <a:t>d</a:t>
+            </a:r>
+            <a:r>
+              <a:rPr lang="en-US" sz="1400" dirty="0" smtClean="0">
+                <a:solidFill>
+                  <a:srgbClr val="000000"/>
+                </a:solidFill>
+                <a:latin typeface="Times New Roman"/>
+                <a:cs typeface="Times New Roman"/>
+              </a:rPr>
+              <a:t>ata anonymization, encryption, </a:t>
+            </a:r>
+          </a:p>
+          <a:p>
+            <a:pPr marL="284163"/>
+            <a:r>
+              <a:rPr lang="en-US" sz="1400" dirty="0" smtClean="0">
+                <a:solidFill>
+                  <a:srgbClr val="000000"/>
+                </a:solidFill>
+                <a:latin typeface="Times New Roman"/>
+                <a:cs typeface="Times New Roman"/>
+              </a:rPr>
+              <a:t>local storage, and transfer to cloud</a:t>
+            </a:r>
+          </a:p>
+        </p:txBody>
+      </p:sp>
+      <p:sp>
+        <p:nvSpPr>
+          <p:cNvPr id="26" name="Rounded Rectangle 25"/>
           <p:cNvSpPr/>
           <p:nvPr/>
         </p:nvSpPr>
         <p:spPr>
           <a:xfrm>
-            <a:off x="1" y="4577536"/>
-            <a:ext cx="9144000" cy="2280463"/>
+            <a:off x="2394654" y="3371893"/>
+            <a:ext cx="3119045" cy="1270970"/>
           </a:xfrm>
           <a:prstGeom prst="roundRect">
             <a:avLst/>
           </a:prstGeom>
-          <a:solidFill>
-            <a:schemeClr val="accent4">
-              <a:lumMod val="60000"/>
-              <a:lumOff val="40000"/>
-            </a:schemeClr>
-          </a:solidFill>
-          <a:ln>
-            <a:solidFill>
-              <a:schemeClr val="accent4">
-                <a:lumMod val="50000"/>
-              </a:schemeClr>
-            </a:solidFill>
-          </a:ln>
+          <a:ln/>
         </p:spPr>
         <p:style>
-          <a:lnRef idx="1">
-            <a:schemeClr val="accent1"/>
+          <a:lnRef idx="0">
+            <a:schemeClr val="accent6"/>
           </a:lnRef>
           <a:fillRef idx="3">
-            <a:schemeClr val="accent1"/>
+            <a:schemeClr val="accent6"/>
           </a:fillRef>
-          <a:effectRef idx="2">
-            <a:schemeClr val="accent1"/>
+          <a:effectRef idx="3">
+            <a:schemeClr val="accent6"/>
           </a:effectRef>
           <a:fontRef idx="minor">
             <a:schemeClr val="lt1"/>
           </a:fontRef>
         </p:style>
         <p:txBody>
-          <a:bodyPr rtlCol="0" anchor="t"/>
+          <a:bodyPr lIns="91440" tIns="45720" rIns="91440" bIns="45720" anchor="ctr"/>
           <a:lstStyle/>
           <a:p>
             <a:pPr algn="ctr"/>
             <a:r>
-              <a:rPr lang="en-US" dirty="0" smtClean="0">
+              <a:rPr lang="en-US" sz="1200" u="sng" dirty="0" smtClean="0">
                 <a:solidFill>
                   <a:srgbClr val="000000"/>
                 </a:solidFill>
+                <a:latin typeface="Times New Roman"/>
+                <a:cs typeface="Times New Roman"/>
               </a:rPr>
-              <a:t>Foundational Shared Projects</a:t>
-            </a:r>
-            <a:endParaRPr lang="en-US" dirty="0">
+              <a:t>REaDI Sense for Android</a:t>
+            </a:r>
+          </a:p>
+          <a:p>
+            <a:r>
+              <a:rPr lang="en-US" sz="1200" dirty="0" smtClean="0">
+                <a:solidFill>
+                  <a:srgbClr val="000000"/>
+                </a:solidFill>
+                <a:latin typeface="Times New Roman"/>
+                <a:cs typeface="Times New Roman"/>
+              </a:rPr>
+              <a:t>Android-specific</a:t>
+            </a:r>
+            <a:r>
+              <a:rPr lang="is-IS" sz="1200" dirty="0" smtClean="0">
+                <a:solidFill>
+                  <a:srgbClr val="000000"/>
+                </a:solidFill>
+                <a:latin typeface="Times New Roman"/>
+                <a:cs typeface="Times New Roman"/>
+              </a:rPr>
+              <a:t>…</a:t>
+            </a:r>
+            <a:endParaRPr lang="en-US" sz="1200" dirty="0" smtClean="0">
               <a:solidFill>
                 <a:srgbClr val="000000"/>
               </a:solidFill>
+              <a:latin typeface="Times New Roman"/>
+              <a:cs typeface="Times New Roman"/>
             </a:endParaRPr>
           </a:p>
-        </p:txBody>
-      </p:sp>
-      <p:sp>
-        <p:nvSpPr>
-          <p:cNvPr id="4" name="Rounded Rectangle 3"/>
+          <a:p>
+            <a:pPr marL="171450" indent="-171450">
+              <a:buFont typeface="Arial"/>
+              <a:buChar char="•"/>
+            </a:pPr>
+            <a:r>
+              <a:rPr lang="en-US" sz="1200" dirty="0" smtClean="0">
+                <a:solidFill>
+                  <a:srgbClr val="000000"/>
+                </a:solidFill>
+                <a:latin typeface="Times New Roman"/>
+                <a:cs typeface="Times New Roman"/>
+              </a:rPr>
+              <a:t>library references, e.g., to SensorManager</a:t>
+            </a:r>
+            <a:r>
+              <a:rPr lang="en-US" sz="1200" dirty="0">
+                <a:solidFill>
+                  <a:srgbClr val="000000"/>
+                </a:solidFill>
+                <a:latin typeface="Times New Roman"/>
+                <a:cs typeface="Times New Roman"/>
+              </a:rPr>
+              <a:t> </a:t>
+            </a:r>
+            <a:r>
+              <a:rPr lang="en-US" sz="1200" dirty="0" smtClean="0">
+                <a:solidFill>
+                  <a:srgbClr val="000000"/>
+                </a:solidFill>
+                <a:latin typeface="Times New Roman"/>
+                <a:cs typeface="Times New Roman"/>
+              </a:rPr>
+              <a:t>for </a:t>
+            </a:r>
+            <a:r>
+              <a:rPr lang="en-US" sz="1200" dirty="0" smtClean="0">
+                <a:solidFill>
+                  <a:srgbClr val="000000"/>
+                </a:solidFill>
+                <a:latin typeface="Times New Roman"/>
+                <a:cs typeface="Times New Roman"/>
+              </a:rPr>
+              <a:t>accelerometer.</a:t>
+            </a:r>
+          </a:p>
+          <a:p>
+            <a:pPr marL="171450" indent="-171450">
+              <a:buFont typeface="Arial"/>
+              <a:buChar char="•"/>
+            </a:pPr>
+            <a:r>
+              <a:rPr lang="en-US" sz="1200" dirty="0" smtClean="0">
+                <a:solidFill>
+                  <a:srgbClr val="000000"/>
+                </a:solidFill>
+                <a:latin typeface="Times New Roman"/>
+                <a:cs typeface="Times New Roman"/>
+              </a:rPr>
+              <a:t>unit and automated UI testing.</a:t>
+            </a:r>
+            <a:endParaRPr lang="en-US" sz="1200" dirty="0">
+              <a:solidFill>
+                <a:srgbClr val="000000"/>
+              </a:solidFill>
+              <a:latin typeface="Times New Roman"/>
+              <a:cs typeface="Times New Roman"/>
+            </a:endParaRPr>
+          </a:p>
+        </p:txBody>
+      </p:sp>
+      <p:sp>
+        <p:nvSpPr>
+          <p:cNvPr id="34" name="Rounded Rectangle 33"/>
           <p:cNvSpPr/>
           <p:nvPr/>
         </p:nvSpPr>
         <p:spPr>
           <a:xfrm>
-            <a:off x="1071028" y="5155635"/>
-            <a:ext cx="3393161" cy="1446471"/>
+            <a:off x="5523177" y="3363428"/>
+            <a:ext cx="3105699" cy="1270970"/>
           </a:xfrm>
           <a:prstGeom prst="roundRect">
             <a:avLst/>
           </a:prstGeom>
-          <a:solidFill>
-            <a:schemeClr val="accent2">
-              <a:lumMod val="60000"/>
-              <a:lumOff val="40000"/>
-            </a:schemeClr>
-          </a:solidFill>
-          <a:ln>
-            <a:solidFill>
-              <a:srgbClr val="800000"/>
-            </a:solidFill>
-          </a:ln>
+          <a:ln/>
         </p:spPr>
         <p:style>
-          <a:lnRef idx="1">
-            <a:schemeClr val="accent1"/>
+          <a:lnRef idx="0">
+            <a:schemeClr val="accent6"/>
           </a:lnRef>
           <a:fillRef idx="3">
-            <a:schemeClr val="accent1"/>
+            <a:schemeClr val="accent6"/>
           </a:fillRef>
-          <a:effectRef idx="2">
-            <a:schemeClr val="accent1"/>
+          <a:effectRef idx="3">
+            <a:schemeClr val="accent6"/>
           </a:effectRef>
           <a:fontRef idx="minor">
             <a:schemeClr val="lt1"/>
@@ -3357,41 +3566,212 @@
           <a:p>
             <a:pPr algn="ctr"/>
             <a:r>
-              <a:rPr lang="en-US" sz="1200" u="sng" dirty="0" err="1" smtClean="0">
+              <a:rPr lang="en-US" sz="1200" u="sng" dirty="0" smtClean="0">
                 <a:solidFill>
                   <a:srgbClr val="000000"/>
                 </a:solidFill>
+                <a:latin typeface="Times New Roman"/>
+                <a:cs typeface="Times New Roman"/>
               </a:rPr>
-              <a:t>SensusService</a:t>
-            </a:r>
-            <a:endParaRPr lang="en-US" sz="1200" u="sng" dirty="0" smtClean="0">
+              <a:t>REaDI Sense for iOS</a:t>
+            </a:r>
+          </a:p>
+          <a:p>
+            <a:r>
+              <a:rPr lang="en-US" sz="1200" dirty="0" smtClean="0">
+                <a:solidFill>
+                  <a:srgbClr val="000000"/>
+                </a:solidFill>
+                <a:latin typeface="Times New Roman"/>
+                <a:cs typeface="Times New Roman"/>
+              </a:rPr>
+              <a:t>iOS-specific</a:t>
+            </a:r>
+            <a:r>
+              <a:rPr lang="is-IS" sz="1200" dirty="0" smtClean="0">
+                <a:solidFill>
+                  <a:srgbClr val="000000"/>
+                </a:solidFill>
+                <a:latin typeface="Times New Roman"/>
+                <a:cs typeface="Times New Roman"/>
+              </a:rPr>
+              <a:t>…</a:t>
+            </a:r>
+            <a:endParaRPr lang="en-US" sz="1200" dirty="0" smtClean="0">
               <a:solidFill>
                 <a:srgbClr val="000000"/>
               </a:solidFill>
+              <a:latin typeface="Times New Roman"/>
+              <a:cs typeface="Times New Roman"/>
             </a:endParaRPr>
           </a:p>
+          <a:p>
+            <a:pPr marL="171450" indent="-171450">
+              <a:buFont typeface="Arial"/>
+              <a:buChar char="•"/>
+            </a:pPr>
+            <a:r>
+              <a:rPr lang="en-US" sz="1200" dirty="0" smtClean="0">
+                <a:solidFill>
+                  <a:srgbClr val="000000"/>
+                </a:solidFill>
+                <a:latin typeface="Times New Roman"/>
+                <a:cs typeface="Times New Roman"/>
+              </a:rPr>
+              <a:t>library references</a:t>
+            </a:r>
+            <a:r>
+              <a:rPr lang="en-US" sz="1200" dirty="0" smtClean="0">
+                <a:solidFill>
+                  <a:srgbClr val="000000"/>
+                </a:solidFill>
+                <a:latin typeface="Times New Roman"/>
+                <a:cs typeface="Times New Roman"/>
+              </a:rPr>
+              <a:t>, e.g., to CMMotionManager accelerometer.</a:t>
+            </a:r>
+          </a:p>
+          <a:p>
+            <a:pPr marL="171450" indent="-171450">
+              <a:buFont typeface="Arial"/>
+              <a:buChar char="•"/>
+            </a:pPr>
+            <a:r>
+              <a:rPr lang="en-US" sz="1200" dirty="0" smtClean="0">
+                <a:solidFill>
+                  <a:srgbClr val="000000"/>
+                </a:solidFill>
+                <a:latin typeface="Times New Roman"/>
+                <a:cs typeface="Times New Roman"/>
+              </a:rPr>
+              <a:t>unit and automated UI testing.</a:t>
+            </a:r>
+            <a:endParaRPr lang="en-US" sz="1200" dirty="0">
+              <a:solidFill>
+                <a:srgbClr val="000000"/>
+              </a:solidFill>
+              <a:latin typeface="Times New Roman"/>
+              <a:cs typeface="Times New Roman"/>
+            </a:endParaRPr>
+          </a:p>
+        </p:txBody>
+      </p:sp>
+      <p:sp>
+        <p:nvSpPr>
+          <p:cNvPr id="14" name="TextBox 13"/>
+          <p:cNvSpPr txBox="1"/>
+          <p:nvPr/>
+        </p:nvSpPr>
+        <p:spPr>
+          <a:xfrm>
+            <a:off x="3201250" y="180626"/>
+            <a:ext cx="1396536" cy="369332"/>
+          </a:xfrm>
+          <a:prstGeom prst="rect">
+            <a:avLst/>
+          </a:prstGeom>
+          <a:noFill/>
+        </p:spPr>
+        <p:txBody>
+          <a:bodyPr wrap="none" rtlCol="0">
+            <a:spAutoFit/>
+          </a:bodyPr>
+          <a:lstStyle/>
+          <a:p>
+            <a:r>
+              <a:rPr lang="en-US" dirty="0" smtClean="0">
+                <a:latin typeface="Times New Roman"/>
+                <a:cs typeface="Times New Roman"/>
+              </a:rPr>
+              <a:t>Android App</a:t>
+            </a:r>
+            <a:endParaRPr lang="en-US" dirty="0">
+              <a:latin typeface="Times New Roman"/>
+              <a:cs typeface="Times New Roman"/>
+            </a:endParaRPr>
+          </a:p>
+        </p:txBody>
+      </p:sp>
+      <p:sp>
+        <p:nvSpPr>
+          <p:cNvPr id="37" name="TextBox 36"/>
+          <p:cNvSpPr txBox="1"/>
+          <p:nvPr/>
+        </p:nvSpPr>
+        <p:spPr>
+          <a:xfrm>
+            <a:off x="6556644" y="180626"/>
+            <a:ext cx="986380" cy="369332"/>
+          </a:xfrm>
+          <a:prstGeom prst="rect">
+            <a:avLst/>
+          </a:prstGeom>
+          <a:noFill/>
+        </p:spPr>
+        <p:txBody>
+          <a:bodyPr wrap="none" rtlCol="0">
+            <a:spAutoFit/>
+          </a:bodyPr>
+          <a:lstStyle/>
+          <a:p>
+            <a:r>
+              <a:rPr lang="en-US" dirty="0" smtClean="0">
+                <a:latin typeface="Times New Roman"/>
+                <a:cs typeface="Times New Roman"/>
+              </a:rPr>
+              <a:t>iOS App</a:t>
+            </a:r>
+            <a:endParaRPr lang="en-US" dirty="0">
+              <a:latin typeface="Times New Roman"/>
+              <a:cs typeface="Times New Roman"/>
+            </a:endParaRPr>
+          </a:p>
+        </p:txBody>
+      </p:sp>
+      <p:sp>
+        <p:nvSpPr>
+          <p:cNvPr id="2" name="Rectangle 1"/>
+          <p:cNvSpPr/>
+          <p:nvPr/>
+        </p:nvSpPr>
+        <p:spPr>
+          <a:xfrm>
+            <a:off x="5823359" y="5461009"/>
+            <a:ext cx="2652305" cy="954107"/>
+          </a:xfrm>
+          <a:prstGeom prst="rect">
+            <a:avLst/>
+          </a:prstGeom>
+        </p:spPr>
+        <p:txBody>
+          <a:bodyPr wrap="square">
+            <a:spAutoFit/>
+          </a:bodyPr>
+          <a:lstStyle/>
           <a:p>
             <a:pPr marL="285750" indent="-285750">
               <a:buFont typeface="Arial"/>
               <a:buChar char="•"/>
             </a:pPr>
             <a:r>
-              <a:rPr lang="en-US" sz="1200" dirty="0" smtClean="0">
+              <a:rPr lang="en-US" sz="1400" dirty="0" smtClean="0">
                 <a:solidFill>
                   <a:srgbClr val="000000"/>
                 </a:solidFill>
-                <a:latin typeface="Courier"/>
-                <a:cs typeface="Courier"/>
+                <a:latin typeface="Times New Roman"/>
+                <a:cs typeface="Times New Roman"/>
               </a:rPr>
-              <a:t>Protocol</a:t>
-            </a:r>
-            <a:r>
-              <a:rPr lang="en-US" sz="1200" dirty="0" smtClean="0">
+              <a:t>networking </a:t>
+            </a:r>
+            <a:r>
+              <a:rPr lang="en-US" sz="1400" dirty="0">
                 <a:solidFill>
                   <a:srgbClr val="000000"/>
                 </a:solidFill>
+                <a:latin typeface="Times New Roman"/>
+                <a:cs typeface="Times New Roman"/>
               </a:rPr>
-              <a:t>:  Full implementation</a:t>
+              <a:t>and security</a:t>
             </a:r>
           </a:p>
           <a:p>
@@ -3400,22 +3780,24 @@
               <a:buChar char="•"/>
             </a:pPr>
             <a:r>
-              <a:rPr lang="en-US" sz="1200" dirty="0" smtClean="0">
+              <a:rPr lang="en-US" sz="1400" dirty="0" smtClean="0">
                 <a:solidFill>
                   <a:srgbClr val="000000"/>
                 </a:solidFill>
-                <a:latin typeface="Courier"/>
-                <a:cs typeface="Courier"/>
+                <a:latin typeface="Times New Roman"/>
+                <a:cs typeface="Times New Roman"/>
               </a:rPr>
-              <a:t>Probe</a:t>
-            </a:r>
-            <a:r>
-              <a:rPr lang="en-US" sz="1200" dirty="0" smtClean="0">
+              <a:t>power </a:t>
+            </a:r>
+            <a:r>
+              <a:rPr lang="en-US" sz="1400" dirty="0">
                 <a:solidFill>
                   <a:srgbClr val="000000"/>
                 </a:solidFill>
+                <a:latin typeface="Times New Roman"/>
+                <a:cs typeface="Times New Roman"/>
               </a:rPr>
-              <a:t> classes:  Many are abstract</a:t>
+              <a:t>management</a:t>
             </a:r>
           </a:p>
           <a:p>
@@ -3424,22 +3806,24 @@
               <a:buChar char="•"/>
             </a:pPr>
             <a:r>
-              <a:rPr lang="en-US" sz="1200" dirty="0" err="1" smtClean="0">
+              <a:rPr lang="en-US" sz="1400" dirty="0" smtClean="0">
                 <a:solidFill>
                   <a:srgbClr val="000000"/>
                 </a:solidFill>
-                <a:latin typeface="Courier"/>
-                <a:cs typeface="Courier"/>
+                <a:latin typeface="Times New Roman"/>
+                <a:cs typeface="Times New Roman"/>
               </a:rPr>
-              <a:t>DataStore</a:t>
-            </a:r>
-            <a:r>
-              <a:rPr lang="en-US" sz="1200" dirty="0" smtClean="0">
+              <a:t>user </a:t>
+            </a:r>
+            <a:r>
+              <a:rPr lang="en-US" sz="1400" dirty="0">
                 <a:solidFill>
                   <a:srgbClr val="000000"/>
                 </a:solidFill>
+                <a:latin typeface="Times New Roman"/>
+                <a:cs typeface="Times New Roman"/>
               </a:rPr>
-              <a:t> classes:  Full implementations</a:t>
+              <a:t>interface design</a:t>
             </a:r>
           </a:p>
           <a:p>
@@ -3448,386 +3832,179 @@
               <a:buChar char="•"/>
             </a:pPr>
             <a:r>
-              <a:rPr lang="en-US" sz="1200" dirty="0" smtClean="0">
+              <a:rPr lang="en-US" sz="1400" dirty="0" smtClean="0">
                 <a:solidFill>
                   <a:srgbClr val="000000"/>
                 </a:solidFill>
+                <a:latin typeface="Times New Roman"/>
+                <a:cs typeface="Times New Roman"/>
               </a:rPr>
-              <a:t>…</a:t>
-            </a:r>
-            <a:endParaRPr lang="en-US" sz="1200" dirty="0">
+              <a:t>unit </a:t>
+            </a:r>
+            <a:r>
+              <a:rPr lang="en-US" sz="1400" dirty="0">
+                <a:solidFill>
+                  <a:srgbClr val="000000"/>
+                </a:solidFill>
+                <a:latin typeface="Times New Roman"/>
+                <a:cs typeface="Times New Roman"/>
+              </a:rPr>
+              <a:t>and automated UI testing</a:t>
+            </a:r>
+            <a:endParaRPr lang="en-US" sz="1400" dirty="0">
               <a:solidFill>
                 <a:srgbClr val="000000"/>
               </a:solidFill>
+              <a:latin typeface="Times New Roman"/>
+              <a:cs typeface="Times New Roman"/>
             </a:endParaRPr>
           </a:p>
         </p:txBody>
       </p:sp>
       <p:sp>
         <p:nvSpPr>
-          <p:cNvPr id="26" name="Rounded Rectangle 25"/>
-          <p:cNvSpPr/>
+          <p:cNvPr id="19" name="TextBox 18"/>
+          <p:cNvSpPr txBox="1"/>
           <p:nvPr/>
         </p:nvSpPr>
         <p:spPr>
           <a:xfrm>
-            <a:off x="2" y="3306566"/>
-            <a:ext cx="3119045" cy="1270970"/>
+            <a:off x="470600" y="3578297"/>
+            <a:ext cx="1787644" cy="800219"/>
           </a:xfrm>
-          <a:prstGeom prst="roundRect">
+          <a:prstGeom prst="rect">
             <a:avLst/>
           </a:prstGeom>
-          <a:solidFill>
-            <a:schemeClr val="accent6">
-              <a:lumMod val="60000"/>
-              <a:lumOff val="40000"/>
-            </a:schemeClr>
-          </a:solidFill>
-          <a:ln>
-            <a:solidFill>
-              <a:schemeClr val="accent6">
-                <a:lumMod val="50000"/>
-              </a:schemeClr>
-            </a:solidFill>
-          </a:ln>
+          <a:noFill/>
         </p:spPr>
-        <p:style>
-          <a:lnRef idx="1">
-            <a:schemeClr val="accent1"/>
-          </a:lnRef>
-          <a:fillRef idx="3">
-            <a:schemeClr val="accent1"/>
-          </a:fillRef>
-          <a:effectRef idx="2">
-            <a:schemeClr val="accent1"/>
-          </a:effectRef>
-          <a:fontRef idx="minor">
-            <a:schemeClr val="lt1"/>
-          </a:fontRef>
-        </p:style>
-        <p:txBody>
-          <a:bodyPr lIns="91440" tIns="45720" rIns="91440" bIns="45720" anchor="ctr"/>
+        <p:txBody>
+          <a:bodyPr wrap="square" rtlCol="0">
+            <a:spAutoFit/>
+          </a:bodyPr>
           <a:lstStyle/>
           <a:p>
             <a:pPr algn="ctr"/>
             <a:r>
-              <a:rPr lang="en-US" sz="1200" u="sng" dirty="0" smtClean="0">
-                <a:solidFill>
-                  <a:srgbClr val="000000"/>
-                </a:solidFill>
+              <a:rPr lang="en-US" dirty="0" smtClean="0">
+                <a:latin typeface="Times New Roman"/>
+                <a:cs typeface="Times New Roman"/>
               </a:rPr>
-              <a:t>Sensus.Android</a:t>
-            </a:r>
-          </a:p>
-          <a:p>
-            <a:pPr algn="ctr"/>
-            <a:r>
-              <a:rPr lang="en-US" sz="1200" dirty="0" smtClean="0">
-                <a:solidFill>
-                  <a:srgbClr val="000000"/>
-                </a:solidFill>
+              <a:t>20% of codebase</a:t>
+            </a:r>
+          </a:p>
+          <a:p>
+            <a:pPr marL="227013" indent="-227013">
+              <a:buFont typeface="Arial"/>
+              <a:buChar char="•"/>
+            </a:pPr>
+            <a:r>
+              <a:rPr lang="en-US" sz="1400" dirty="0" smtClean="0">
+                <a:latin typeface="Times New Roman"/>
+                <a:cs typeface="Times New Roman"/>
               </a:rPr>
-              <a:t>Android-specific implementations (e.g., </a:t>
-            </a:r>
-            <a:r>
-              <a:rPr lang="en-US" sz="1200" dirty="0" err="1" smtClean="0">
-                <a:solidFill>
-                  <a:srgbClr val="000000"/>
-                </a:solidFill>
-                <a:latin typeface="Courier"/>
-                <a:cs typeface="Courier"/>
+              <a:t>Few changes</a:t>
+            </a:r>
+          </a:p>
+          <a:p>
+            <a:pPr marL="227013" indent="-227013">
+              <a:buFont typeface="Arial"/>
+              <a:buChar char="•"/>
+            </a:pPr>
+            <a:r>
+              <a:rPr lang="en-US" sz="1400" dirty="0" smtClean="0">
+                <a:latin typeface="Times New Roman"/>
+                <a:cs typeface="Times New Roman"/>
               </a:rPr>
-              <a:t>AndroidAccelerometerProbe</a:t>
-            </a:r>
-            <a:r>
-              <a:rPr lang="en-US" sz="1200" dirty="0" smtClean="0">
-                <a:solidFill>
-                  <a:srgbClr val="000000"/>
-                </a:solidFill>
-              </a:rPr>
-              <a:t>)</a:t>
-            </a:r>
-            <a:r>
-              <a:rPr lang="en-US" sz="1200" dirty="0" smtClean="0">
-                <a:solidFill>
-                  <a:srgbClr val="000000"/>
-                </a:solidFill>
-              </a:rPr>
-              <a:t>.</a:t>
-            </a:r>
-            <a:endParaRPr lang="en-US" sz="1200" dirty="0">
-              <a:solidFill>
-                <a:srgbClr val="000000"/>
-              </a:solidFill>
+              <a:t>Minimal errors</a:t>
+            </a:r>
+            <a:endParaRPr lang="en-US" sz="1400" dirty="0">
+              <a:latin typeface="Times New Roman"/>
+              <a:cs typeface="Times New Roman"/>
             </a:endParaRPr>
           </a:p>
         </p:txBody>
       </p:sp>
       <p:sp>
         <p:nvSpPr>
-          <p:cNvPr id="32" name="Rounded Rectangle 31"/>
-          <p:cNvSpPr/>
+          <p:cNvPr id="20" name="TextBox 19"/>
+          <p:cNvSpPr txBox="1"/>
           <p:nvPr/>
         </p:nvSpPr>
         <p:spPr>
           <a:xfrm>
-            <a:off x="6224746" y="3306566"/>
-            <a:ext cx="2919255" cy="1270970"/>
+            <a:off x="518018" y="5389222"/>
+            <a:ext cx="1787644" cy="800219"/>
           </a:xfrm>
-          <a:prstGeom prst="roundRect">
+          <a:prstGeom prst="rect">
             <a:avLst/>
           </a:prstGeom>
-          <a:solidFill>
-            <a:schemeClr val="accent6">
-              <a:lumMod val="60000"/>
-              <a:lumOff val="40000"/>
-            </a:schemeClr>
-          </a:solidFill>
-          <a:ln>
-            <a:solidFill>
-              <a:schemeClr val="accent6">
-                <a:lumMod val="50000"/>
-              </a:schemeClr>
-            </a:solidFill>
-          </a:ln>
+          <a:noFill/>
         </p:spPr>
-        <p:style>
-          <a:lnRef idx="1">
-            <a:schemeClr val="accent1"/>
-          </a:lnRef>
-          <a:fillRef idx="3">
-            <a:schemeClr val="accent1"/>
-          </a:fillRef>
-          <a:effectRef idx="2">
-            <a:schemeClr val="accent1"/>
-          </a:effectRef>
-          <a:fontRef idx="minor">
-            <a:schemeClr val="lt1"/>
-          </a:fontRef>
-        </p:style>
-        <p:txBody>
-          <a:bodyPr lIns="91440" tIns="45720" rIns="91440" bIns="45720" anchor="ctr"/>
+        <p:txBody>
+          <a:bodyPr wrap="square" rtlCol="0">
+            <a:spAutoFit/>
+          </a:bodyPr>
           <a:lstStyle/>
           <a:p>
             <a:pPr algn="ctr"/>
             <a:r>
-              <a:rPr lang="en-US" sz="1200" u="sng" dirty="0" err="1" smtClean="0">
-                <a:solidFill>
-                  <a:srgbClr val="000000"/>
-                </a:solidFill>
+              <a:rPr lang="en-US" dirty="0" smtClean="0">
+                <a:latin typeface="Times New Roman"/>
+                <a:cs typeface="Times New Roman"/>
               </a:rPr>
-              <a:t>Sensus.WinPhone</a:t>
-            </a:r>
-            <a:endParaRPr lang="en-US" sz="1200" u="sng" dirty="0" smtClean="0">
-              <a:solidFill>
-                <a:srgbClr val="000000"/>
-              </a:solidFill>
-            </a:endParaRPr>
-          </a:p>
-          <a:p>
-            <a:pPr algn="ctr"/>
-            <a:r>
-              <a:rPr lang="en-US" sz="1200" dirty="0" smtClean="0">
-                <a:solidFill>
-                  <a:srgbClr val="000000"/>
-                </a:solidFill>
+              <a:t>80% of codebase</a:t>
+            </a:r>
+          </a:p>
+          <a:p>
+            <a:pPr marL="227013" indent="-227013">
+              <a:buFont typeface="Arial"/>
+              <a:buChar char="•"/>
+            </a:pPr>
+            <a:r>
+              <a:rPr lang="en-US" sz="1400" dirty="0" smtClean="0">
+                <a:latin typeface="Times New Roman"/>
+                <a:cs typeface="Times New Roman"/>
               </a:rPr>
-              <a:t>Windows</a:t>
-            </a:r>
-            <a:r>
-              <a:rPr lang="en-US" sz="1200" dirty="0" smtClean="0">
-                <a:solidFill>
-                  <a:srgbClr val="000000"/>
-                </a:solidFill>
+              <a:t>Frequent changes</a:t>
+            </a:r>
+          </a:p>
+          <a:p>
+            <a:pPr marL="227013" indent="-227013">
+              <a:buFont typeface="Arial"/>
+              <a:buChar char="•"/>
+            </a:pPr>
+            <a:r>
+              <a:rPr lang="en-US" sz="1400" dirty="0" smtClean="0">
+                <a:latin typeface="Times New Roman"/>
+                <a:cs typeface="Times New Roman"/>
               </a:rPr>
-              <a:t>-specific implementations (e.g., </a:t>
-            </a:r>
-            <a:r>
-              <a:rPr lang="en-US" sz="1200" dirty="0" err="1" smtClean="0">
-                <a:solidFill>
-                  <a:srgbClr val="000000"/>
-                </a:solidFill>
-                <a:latin typeface="Courier"/>
-                <a:cs typeface="Courier"/>
-              </a:rPr>
-              <a:t>WinPhone</a:t>
-            </a:r>
-            <a:r>
-              <a:rPr lang="en-US" sz="1200" dirty="0" err="1" smtClean="0">
-                <a:solidFill>
-                  <a:srgbClr val="000000"/>
-                </a:solidFill>
-                <a:latin typeface="Courier"/>
-                <a:cs typeface="Courier"/>
-              </a:rPr>
-              <a:t>AccelerometerProbe</a:t>
-            </a:r>
-            <a:r>
-              <a:rPr lang="en-US" sz="1200" dirty="0" smtClean="0">
-                <a:solidFill>
-                  <a:srgbClr val="000000"/>
-                </a:solidFill>
-              </a:rPr>
-              <a:t>)</a:t>
-            </a:r>
-            <a:r>
-              <a:rPr lang="en-US" sz="1200" dirty="0" smtClean="0">
-                <a:solidFill>
-                  <a:srgbClr val="000000"/>
-                </a:solidFill>
-              </a:rPr>
-              <a:t>.</a:t>
-            </a:r>
-            <a:endParaRPr lang="en-US" sz="1200" dirty="0">
-              <a:solidFill>
-                <a:srgbClr val="000000"/>
-              </a:solidFill>
-            </a:endParaRPr>
-          </a:p>
-        </p:txBody>
-      </p:sp>
-      <p:sp>
-        <p:nvSpPr>
-          <p:cNvPr id="34" name="Rounded Rectangle 33"/>
-          <p:cNvSpPr/>
-          <p:nvPr/>
-        </p:nvSpPr>
-        <p:spPr>
-          <a:xfrm>
-            <a:off x="3119047" y="3306566"/>
-            <a:ext cx="3105699" cy="1270970"/>
-          </a:xfrm>
-          <a:prstGeom prst="roundRect">
-            <a:avLst/>
-          </a:prstGeom>
-          <a:solidFill>
-            <a:schemeClr val="accent6">
-              <a:lumMod val="60000"/>
-              <a:lumOff val="40000"/>
-            </a:schemeClr>
-          </a:solidFill>
-          <a:ln>
-            <a:solidFill>
-              <a:schemeClr val="accent6">
-                <a:lumMod val="50000"/>
-              </a:schemeClr>
-            </a:solidFill>
-          </a:ln>
-        </p:spPr>
-        <p:style>
-          <a:lnRef idx="1">
-            <a:schemeClr val="accent1"/>
-          </a:lnRef>
-          <a:fillRef idx="3">
-            <a:schemeClr val="accent1"/>
-          </a:fillRef>
-          <a:effectRef idx="2">
-            <a:schemeClr val="accent1"/>
-          </a:effectRef>
-          <a:fontRef idx="minor">
-            <a:schemeClr val="lt1"/>
-          </a:fontRef>
-        </p:style>
-        <p:txBody>
-          <a:bodyPr lIns="91440" tIns="45720" rIns="91440" bIns="45720" anchor="ctr"/>
-          <a:lstStyle/>
-          <a:p>
-            <a:pPr algn="ctr"/>
-            <a:r>
-              <a:rPr lang="en-US" sz="1200" u="sng" dirty="0" smtClean="0">
-                <a:solidFill>
-                  <a:srgbClr val="000000"/>
-                </a:solidFill>
-              </a:rPr>
-              <a:t>Sensus.iOS</a:t>
-            </a:r>
-          </a:p>
-          <a:p>
-            <a:pPr algn="ctr"/>
-            <a:r>
-              <a:rPr lang="en-US" sz="1200" dirty="0" err="1" smtClean="0">
-                <a:solidFill>
-                  <a:srgbClr val="000000"/>
-                </a:solidFill>
-              </a:rPr>
-              <a:t>iOS</a:t>
-            </a:r>
-            <a:r>
-              <a:rPr lang="en-US" sz="1200" dirty="0" smtClean="0">
-                <a:solidFill>
-                  <a:srgbClr val="000000"/>
-                </a:solidFill>
-              </a:rPr>
-              <a:t>-specific implementations (e.g., </a:t>
-            </a:r>
-            <a:r>
-              <a:rPr lang="en-US" sz="1200" dirty="0" err="1" smtClean="0">
-                <a:solidFill>
-                  <a:srgbClr val="000000"/>
-                </a:solidFill>
-                <a:latin typeface="Courier"/>
-                <a:cs typeface="Courier"/>
-              </a:rPr>
-              <a:t>iOS</a:t>
-            </a:r>
-            <a:r>
-              <a:rPr lang="en-US" sz="1200" dirty="0" err="1" smtClean="0">
-                <a:solidFill>
-                  <a:srgbClr val="000000"/>
-                </a:solidFill>
-                <a:latin typeface="Courier"/>
-                <a:cs typeface="Courier"/>
-              </a:rPr>
-              <a:t>AccelerometerProbe</a:t>
-            </a:r>
-            <a:r>
-              <a:rPr lang="en-US" sz="1200" dirty="0" smtClean="0">
-                <a:solidFill>
-                  <a:srgbClr val="000000"/>
-                </a:solidFill>
-              </a:rPr>
-              <a:t>)</a:t>
-            </a:r>
-            <a:r>
-              <a:rPr lang="en-US" sz="1200" dirty="0" smtClean="0">
-                <a:solidFill>
-                  <a:srgbClr val="000000"/>
-                </a:solidFill>
-              </a:rPr>
-              <a:t>.</a:t>
-            </a:r>
-            <a:endParaRPr lang="en-US" sz="1200" dirty="0">
-              <a:solidFill>
-                <a:srgbClr val="000000"/>
-              </a:solidFill>
+              <a:t>Most errors</a:t>
+            </a:r>
+            <a:endParaRPr lang="en-US" sz="1400" dirty="0">
+              <a:latin typeface="Times New Roman"/>
+              <a:cs typeface="Times New Roman"/>
             </a:endParaRPr>
           </a:p>
         </p:txBody>
       </p:sp>
       <p:pic>
         <p:nvPicPr>
-          <p:cNvPr id="8" name="Picture 7" descr="main_screen.png"/>
+          <p:cNvPr id="7" name="Picture 6"/>
           <p:cNvPicPr>
             <a:picLocks noChangeAspect="1"/>
           </p:cNvPicPr>
           <p:nvPr/>
         </p:nvPicPr>
         <p:blipFill>
-          <a:blip r:embed="rId2">
-            <a:extLst>
-              <a:ext uri="{28A0092B-C50C-407E-A947-70E740481C1C}">
-                <a14:useLocalDpi xmlns:a14="http://schemas.microsoft.com/office/drawing/2010/main" val="0"/>
-              </a:ext>
-            </a:extLst>
-          </a:blip>
+          <a:blip r:embed="rId2"/>
           <a:stretch>
             <a:fillRect/>
           </a:stretch>
         </p:blipFill>
         <p:spPr>
           <a:xfrm>
-            <a:off x="790999" y="549679"/>
-            <a:ext cx="1432033" cy="2545836"/>
+            <a:off x="3152208" y="549678"/>
+            <a:ext cx="1511926" cy="2687045"/>
           </a:xfrm>
           <a:prstGeom prst="rect">
             <a:avLst/>
@@ -3836,7 +4013,7 @@
       </p:pic>
       <p:pic>
         <p:nvPicPr>
-          <p:cNvPr id="9" name="Picture 8" descr="main_screen.PNG"/>
+          <p:cNvPr id="10" name="Picture 9" descr="IMG_0333.PNG"/>
           <p:cNvPicPr>
             <a:picLocks noChangeAspect="1"/>
           </p:cNvPicPr>
@@ -3856,229 +4033,14 @@
         </p:blipFill>
         <p:spPr>
           <a:xfrm>
-            <a:off x="3946842" y="549679"/>
-            <a:ext cx="1434274" cy="2545836"/>
+            <a:off x="6317922" y="549679"/>
+            <a:ext cx="1513828" cy="2687044"/>
           </a:xfrm>
           <a:prstGeom prst="rect">
             <a:avLst/>
           </a:prstGeom>
         </p:spPr>
       </p:pic>
-      <p:sp>
-        <p:nvSpPr>
-          <p:cNvPr id="35" name="Rectangle 34"/>
-          <p:cNvSpPr/>
-          <p:nvPr/>
-        </p:nvSpPr>
-        <p:spPr>
-          <a:xfrm>
-            <a:off x="6982281" y="549679"/>
-            <a:ext cx="1415317" cy="2545836"/>
-          </a:xfrm>
-          <a:prstGeom prst="rect">
-            <a:avLst/>
-          </a:prstGeom>
-          <a:ln/>
-        </p:spPr>
-        <p:style>
-          <a:lnRef idx="1">
-            <a:schemeClr val="accent5"/>
-          </a:lnRef>
-          <a:fillRef idx="3">
-            <a:schemeClr val="accent5"/>
-          </a:fillRef>
-          <a:effectRef idx="2">
-            <a:schemeClr val="accent5"/>
-          </a:effectRef>
-          <a:fontRef idx="minor">
-            <a:schemeClr val="lt1"/>
-          </a:fontRef>
-        </p:style>
-        <p:txBody>
-          <a:bodyPr/>
-          <a:lstStyle/>
-          <a:p>
-            <a:r>
-              <a:rPr lang="en-US" sz="1400" dirty="0" smtClean="0">
-                <a:solidFill>
-                  <a:schemeClr val="tx1"/>
-                </a:solidFill>
-              </a:rPr>
-              <a:t>Coming soon…</a:t>
-            </a:r>
-            <a:endParaRPr lang="en-US" sz="1400" dirty="0">
-              <a:solidFill>
-                <a:schemeClr val="tx1"/>
-              </a:solidFill>
-            </a:endParaRPr>
-          </a:p>
-        </p:txBody>
-      </p:sp>
-      <p:sp>
-        <p:nvSpPr>
-          <p:cNvPr id="14" name="TextBox 13"/>
-          <p:cNvSpPr txBox="1"/>
-          <p:nvPr/>
-        </p:nvSpPr>
-        <p:spPr>
-          <a:xfrm>
-            <a:off x="995199" y="180347"/>
-            <a:ext cx="937238" cy="369332"/>
-          </a:xfrm>
-          <a:prstGeom prst="rect">
-            <a:avLst/>
-          </a:prstGeom>
-          <a:noFill/>
-        </p:spPr>
-        <p:txBody>
-          <a:bodyPr wrap="none" rtlCol="0">
-            <a:spAutoFit/>
-          </a:bodyPr>
-          <a:lstStyle/>
-          <a:p>
-            <a:r>
-              <a:rPr lang="en-US" dirty="0" smtClean="0"/>
-              <a:t>Android</a:t>
-            </a:r>
-            <a:endParaRPr lang="en-US" dirty="0"/>
-          </a:p>
-        </p:txBody>
-      </p:sp>
-      <p:sp>
-        <p:nvSpPr>
-          <p:cNvPr id="37" name="TextBox 36"/>
-          <p:cNvSpPr txBox="1"/>
-          <p:nvPr/>
-        </p:nvSpPr>
-        <p:spPr>
-          <a:xfrm>
-            <a:off x="4416939" y="180347"/>
-            <a:ext cx="496538" cy="369332"/>
-          </a:xfrm>
-          <a:prstGeom prst="rect">
-            <a:avLst/>
-          </a:prstGeom>
-          <a:noFill/>
-        </p:spPr>
-        <p:txBody>
-          <a:bodyPr wrap="none" rtlCol="0">
-            <a:spAutoFit/>
-          </a:bodyPr>
-          <a:lstStyle/>
-          <a:p>
-            <a:r>
-              <a:rPr lang="en-US" dirty="0" err="1" smtClean="0"/>
-              <a:t>iOS</a:t>
-            </a:r>
-            <a:endParaRPr lang="en-US" dirty="0"/>
-          </a:p>
-        </p:txBody>
-      </p:sp>
-      <p:sp>
-        <p:nvSpPr>
-          <p:cNvPr id="39" name="TextBox 38"/>
-          <p:cNvSpPr txBox="1"/>
-          <p:nvPr/>
-        </p:nvSpPr>
-        <p:spPr>
-          <a:xfrm>
-            <a:off x="6838360" y="180347"/>
-            <a:ext cx="1713142" cy="369332"/>
-          </a:xfrm>
-          <a:prstGeom prst="rect">
-            <a:avLst/>
-          </a:prstGeom>
-          <a:noFill/>
-        </p:spPr>
-        <p:txBody>
-          <a:bodyPr wrap="none" rtlCol="0">
-            <a:spAutoFit/>
-          </a:bodyPr>
-          <a:lstStyle/>
-          <a:p>
-            <a:r>
-              <a:rPr lang="en-US" dirty="0" smtClean="0"/>
-              <a:t>Windows Phone</a:t>
-            </a:r>
-            <a:endParaRPr lang="en-US" dirty="0"/>
-          </a:p>
-        </p:txBody>
-      </p:sp>
-      <p:sp>
-        <p:nvSpPr>
-          <p:cNvPr id="49" name="Rounded Rectangle 48"/>
-          <p:cNvSpPr/>
-          <p:nvPr/>
-        </p:nvSpPr>
-        <p:spPr>
-          <a:xfrm>
-            <a:off x="4663979" y="5155635"/>
-            <a:ext cx="3393161" cy="1446471"/>
-          </a:xfrm>
-          <a:prstGeom prst="roundRect">
-            <a:avLst/>
-          </a:prstGeom>
-          <a:solidFill>
-            <a:schemeClr val="accent2">
-              <a:lumMod val="60000"/>
-              <a:lumOff val="40000"/>
-            </a:schemeClr>
-          </a:solidFill>
-          <a:ln>
-            <a:solidFill>
-              <a:srgbClr val="800000"/>
-            </a:solidFill>
-          </a:ln>
-        </p:spPr>
-        <p:style>
-          <a:lnRef idx="1">
-            <a:schemeClr val="accent1"/>
-          </a:lnRef>
-          <a:fillRef idx="3">
-            <a:schemeClr val="accent1"/>
-          </a:fillRef>
-          <a:effectRef idx="2">
-            <a:schemeClr val="accent1"/>
-          </a:effectRef>
-          <a:fontRef idx="minor">
-            <a:schemeClr val="lt1"/>
-          </a:fontRef>
-        </p:style>
-        <p:txBody>
-          <a:bodyPr lIns="91440" tIns="45720" rIns="91440" bIns="45720" anchor="ctr"/>
-          <a:lstStyle/>
-          <a:p>
-            <a:pPr algn="ctr"/>
-            <a:r>
-              <a:rPr lang="en-US" sz="1200" u="sng" dirty="0" err="1" smtClean="0">
-                <a:solidFill>
-                  <a:srgbClr val="000000"/>
-                </a:solidFill>
-              </a:rPr>
-              <a:t>SensusUI</a:t>
-            </a:r>
-            <a:endParaRPr lang="en-US" sz="1200" u="sng" dirty="0" smtClean="0">
-              <a:solidFill>
-                <a:srgbClr val="000000"/>
-              </a:solidFill>
-            </a:endParaRPr>
-          </a:p>
-          <a:p>
-            <a:pPr marL="285750" indent="-285750">
-              <a:buFont typeface="Arial"/>
-              <a:buChar char="•"/>
-            </a:pPr>
-            <a:r>
-              <a:rPr lang="en-US" sz="1200" dirty="0" smtClean="0">
-                <a:solidFill>
-                  <a:srgbClr val="000000"/>
-                </a:solidFill>
-              </a:rPr>
-              <a:t>UI pages:  All full implementations</a:t>
-            </a:r>
-          </a:p>
-        </p:txBody>
-      </p:sp>
     </p:spTree>
     <p:extLst>
       <p:ext uri="{BB962C8B-B14F-4D97-AF65-F5344CB8AC3E}">

</xml_diff>